<commit_message>
updated fig 1 and fig 4
</commit_message>
<xml_diff>
--- a/images/GillesPy2 Flow Graphic v3.pptx
+++ b/images/GillesPy2 Flow Graphic v3.pptx
@@ -5807,7 +5807,7 @@
         </p:blipFill>
         <p:spPr>
           <a:xfrm>
-            <a:off x="331850" y="1650150"/>
+            <a:off x="271325" y="1726350"/>
             <a:ext cx="809700" cy="809700"/>
           </a:xfrm>
           <a:prstGeom prst="rect">
@@ -5875,37 +5875,9 @@
           </a:ln>
         </p:spPr>
       </p:pic>
-      <p:pic>
-        <p:nvPicPr>
-          <p:cNvPr id="66" name="Google Shape;66;p13"/>
-          <p:cNvPicPr preferRelativeResize="0"/>
-          <p:nvPr/>
-        </p:nvPicPr>
-        <p:blipFill>
-          <a:blip r:embed="rId6">
-            <a:alphaModFix/>
-          </a:blip>
-          <a:stretch>
-            <a:fillRect/>
-          </a:stretch>
-        </p:blipFill>
-        <p:spPr>
-          <a:xfrm>
-            <a:off x="2974025" y="1750200"/>
-            <a:ext cx="609600" cy="609600"/>
-          </a:xfrm>
-          <a:prstGeom prst="rect">
-            <a:avLst/>
-          </a:prstGeom>
-          <a:noFill/>
-          <a:ln>
-            <a:noFill/>
-          </a:ln>
-        </p:spPr>
-      </p:pic>
       <p:cxnSp>
         <p:nvCxnSpPr>
-          <p:cNvPr id="67" name="Google Shape;67;p13"/>
+          <p:cNvPr id="66" name="Google Shape;66;p13"/>
           <p:cNvCxnSpPr/>
           <p:nvPr/>
         </p:nvCxnSpPr>
@@ -5933,7 +5905,7 @@
       </p:cxnSp>
       <p:cxnSp>
         <p:nvCxnSpPr>
-          <p:cNvPr id="68" name="Google Shape;68;p13"/>
+          <p:cNvPr id="67" name="Google Shape;67;p13"/>
           <p:cNvCxnSpPr/>
           <p:nvPr/>
         </p:nvCxnSpPr>
@@ -5961,7 +5933,7 @@
       </p:cxnSp>
       <p:cxnSp>
         <p:nvCxnSpPr>
-          <p:cNvPr id="69" name="Google Shape;69;p13"/>
+          <p:cNvPr id="68" name="Google Shape;68;p13"/>
           <p:cNvCxnSpPr/>
           <p:nvPr/>
         </p:nvCxnSpPr>
@@ -5989,7 +5961,7 @@
       </p:cxnSp>
       <p:cxnSp>
         <p:nvCxnSpPr>
-          <p:cNvPr id="70" name="Google Shape;70;p13"/>
+          <p:cNvPr id="69" name="Google Shape;69;p13"/>
           <p:cNvCxnSpPr/>
           <p:nvPr/>
         </p:nvCxnSpPr>
@@ -6017,7 +5989,7 @@
       </p:cxnSp>
       <p:sp>
         <p:nvSpPr>
-          <p:cNvPr id="71" name="Google Shape;71;p13"/>
+          <p:cNvPr id="70" name="Google Shape;70;p13"/>
           <p:cNvSpPr txBox="1"/>
           <p:nvPr/>
         </p:nvSpPr>
@@ -6069,13 +6041,13 @@
       </p:sp>
       <p:sp>
         <p:nvSpPr>
-          <p:cNvPr id="72" name="Google Shape;72;p13"/>
+          <p:cNvPr id="71" name="Google Shape;71;p13"/>
           <p:cNvSpPr txBox="1"/>
           <p:nvPr/>
         </p:nvSpPr>
         <p:spPr>
           <a:xfrm>
-            <a:off x="3679800" y="1893150"/>
+            <a:off x="3679800" y="1920240"/>
             <a:ext cx="995100" cy="323700"/>
           </a:xfrm>
           <a:prstGeom prst="rect">
@@ -6121,7 +6093,7 @@
       </p:sp>
       <p:sp>
         <p:nvSpPr>
-          <p:cNvPr id="73" name="Google Shape;73;p13"/>
+          <p:cNvPr id="72" name="Google Shape;72;p13"/>
           <p:cNvSpPr txBox="1"/>
           <p:nvPr/>
         </p:nvSpPr>
@@ -6173,13 +6145,13 @@
       </p:sp>
       <p:sp>
         <p:nvSpPr>
-          <p:cNvPr id="74" name="Google Shape;74;p13"/>
+          <p:cNvPr id="73" name="Google Shape;73;p13"/>
           <p:cNvSpPr txBox="1"/>
           <p:nvPr/>
         </p:nvSpPr>
         <p:spPr>
           <a:xfrm>
-            <a:off x="-173050" y="1893150"/>
+            <a:off x="-152575" y="1920240"/>
             <a:ext cx="809700" cy="323700"/>
           </a:xfrm>
           <a:prstGeom prst="rect">
@@ -6225,7 +6197,7 @@
       </p:sp>
       <p:sp>
         <p:nvSpPr>
-          <p:cNvPr id="75" name="Google Shape;75;p13"/>
+          <p:cNvPr id="74" name="Google Shape;74;p13"/>
           <p:cNvSpPr txBox="1"/>
           <p:nvPr/>
         </p:nvSpPr>
@@ -6277,7 +6249,7 @@
       </p:sp>
       <p:sp>
         <p:nvSpPr>
-          <p:cNvPr id="76" name="Google Shape;76;p13"/>
+          <p:cNvPr id="75" name="Google Shape;75;p13"/>
           <p:cNvSpPr txBox="1"/>
           <p:nvPr/>
         </p:nvSpPr>
@@ -6329,7 +6301,7 @@
       </p:sp>
       <p:sp>
         <p:nvSpPr>
-          <p:cNvPr id="77" name="Google Shape;77;p13"/>
+          <p:cNvPr id="76" name="Google Shape;76;p13"/>
           <p:cNvSpPr txBox="1"/>
           <p:nvPr/>
         </p:nvSpPr>
@@ -6381,7 +6353,7 @@
       </p:sp>
       <p:sp>
         <p:nvSpPr>
-          <p:cNvPr id="78" name="Google Shape;78;p13"/>
+          <p:cNvPr id="77" name="Google Shape;77;p13"/>
           <p:cNvSpPr txBox="1"/>
           <p:nvPr/>
         </p:nvSpPr>
@@ -6433,7 +6405,7 @@
       </p:sp>
       <p:sp>
         <p:nvSpPr>
-          <p:cNvPr id="79" name="Google Shape;79;p13"/>
+          <p:cNvPr id="78" name="Google Shape;78;p13"/>
           <p:cNvSpPr txBox="1"/>
           <p:nvPr/>
         </p:nvSpPr>
@@ -6548,18 +6520,14 @@
               <a:buChar char="●"/>
             </a:pPr>
             <a:r>
-              <a:rPr i="1" lang="en" sz="1200"/>
-              <a:t>more:</a:t>
+              <a:rPr lang="en" sz="1100"/>
+              <a:t>Events, Rate Rules, </a:t>
             </a:r>
             <a:r>
-              <a:rPr lang="en" sz="1200"/>
-              <a:t> </a:t>
+              <a:rPr i="1" lang="en" sz="1100"/>
+              <a:t>more…</a:t>
             </a:r>
-            <a:r>
-              <a:rPr lang="en" sz="1100"/>
-              <a:t>Events, Rate Rules</a:t>
-            </a:r>
-            <a:endParaRPr sz="1100"/>
+            <a:endParaRPr i="1" sz="1100"/>
           </a:p>
           <a:p>
             <a:pPr indent="-167640" lvl="0" marL="182880" rtl="0" algn="l">
@@ -6573,12 +6541,12 @@
               <a:buChar char="●"/>
             </a:pPr>
             <a:r>
-              <a:rPr i="1" lang="en" sz="1200"/>
-              <a:t>time:</a:t>
+              <a:rPr lang="en" sz="1200"/>
+              <a:t>Timespan </a:t>
             </a:r>
             <a:r>
               <a:rPr lang="en" sz="1200"/>
-              <a:t> start / end / frequency</a:t>
+              <a:t>/ frequency</a:t>
             </a:r>
             <a:endParaRPr sz="1200"/>
           </a:p>
@@ -6586,14 +6554,14 @@
       </p:sp>
       <p:sp>
         <p:nvSpPr>
-          <p:cNvPr id="80" name="Google Shape;80;p13"/>
+          <p:cNvPr id="79" name="Google Shape;79;p13"/>
           <p:cNvSpPr txBox="1"/>
           <p:nvPr/>
         </p:nvSpPr>
         <p:spPr>
           <a:xfrm>
             <a:off x="4674900" y="1572325"/>
-            <a:ext cx="2564100" cy="1144800"/>
+            <a:ext cx="2564100" cy="1115400"/>
           </a:xfrm>
           <a:prstGeom prst="rect">
             <a:avLst/>
@@ -6735,7 +6703,7 @@
                   <a:srgbClr val="000000"/>
                 </a:solidFill>
               </a:rPr>
-              <a:t>Hybrid: ODE+SSA</a:t>
+              <a:t>Hybrid: ODE + SSA</a:t>
             </a:r>
             <a:endParaRPr sz="1200">
               <a:solidFill>
@@ -6759,7 +6727,19 @@
                   <a:srgbClr val="000000"/>
                 </a:solidFill>
               </a:rPr>
-              <a:t>Pure python &amp; C++ implementations</a:t>
+              <a:t>Pure </a:t>
+            </a:r>
+            <a:r>
+              <a:rPr lang="en" sz="1100"/>
+              <a:t>P</a:t>
+            </a:r>
+            <a:r>
+              <a:rPr lang="en" sz="1100">
+                <a:solidFill>
+                  <a:srgbClr val="000000"/>
+                </a:solidFill>
+              </a:rPr>
+              <a:t>ython &amp; C++ implementations</a:t>
             </a:r>
             <a:endParaRPr sz="1100">
               <a:solidFill>
@@ -6771,14 +6751,14 @@
       </p:sp>
       <p:sp>
         <p:nvSpPr>
-          <p:cNvPr id="81" name="Google Shape;81;p13"/>
+          <p:cNvPr id="80" name="Google Shape;80;p13"/>
           <p:cNvSpPr txBox="1"/>
           <p:nvPr/>
         </p:nvSpPr>
         <p:spPr>
           <a:xfrm>
             <a:off x="3895350" y="2931450"/>
-            <a:ext cx="2838300" cy="1265400"/>
+            <a:ext cx="2564100" cy="1265400"/>
           </a:xfrm>
           <a:prstGeom prst="rect">
             <a:avLst/>
@@ -6999,6 +6979,34 @@
       </p:sp>
       <p:pic>
         <p:nvPicPr>
+          <p:cNvPr id="81" name="Google Shape;81;p13"/>
+          <p:cNvPicPr preferRelativeResize="0"/>
+          <p:nvPr/>
+        </p:nvPicPr>
+        <p:blipFill>
+          <a:blip r:embed="rId6">
+            <a:alphaModFix/>
+          </a:blip>
+          <a:stretch>
+            <a:fillRect/>
+          </a:stretch>
+        </p:blipFill>
+        <p:spPr>
+          <a:xfrm>
+            <a:off x="0" y="4411175"/>
+            <a:ext cx="2432303" cy="2469724"/>
+          </a:xfrm>
+          <a:prstGeom prst="rect">
+            <a:avLst/>
+          </a:prstGeom>
+          <a:noFill/>
+          <a:ln>
+            <a:noFill/>
+          </a:ln>
+        </p:spPr>
+      </p:pic>
+      <p:pic>
+        <p:nvPicPr>
           <p:cNvPr id="82" name="Google Shape;82;p13"/>
           <p:cNvPicPr preferRelativeResize="0"/>
           <p:nvPr/>
@@ -7013,8 +7021,8 @@
         </p:blipFill>
         <p:spPr>
           <a:xfrm>
-            <a:off x="0" y="4411175"/>
-            <a:ext cx="2432303" cy="2469724"/>
+            <a:off x="2441443" y="4411175"/>
+            <a:ext cx="2432302" cy="2385528"/>
           </a:xfrm>
           <a:prstGeom prst="rect">
             <a:avLst/>
@@ -7041,34 +7049,6 @@
         </p:blipFill>
         <p:spPr>
           <a:xfrm>
-            <a:off x="2441443" y="4411175"/>
-            <a:ext cx="2432302" cy="2385528"/>
-          </a:xfrm>
-          <a:prstGeom prst="rect">
-            <a:avLst/>
-          </a:prstGeom>
-          <a:noFill/>
-          <a:ln>
-            <a:noFill/>
-          </a:ln>
-        </p:spPr>
-      </p:pic>
-      <p:pic>
-        <p:nvPicPr>
-          <p:cNvPr id="84" name="Google Shape;84;p13"/>
-          <p:cNvPicPr preferRelativeResize="0"/>
-          <p:nvPr/>
-        </p:nvPicPr>
-        <p:blipFill>
-          <a:blip r:embed="rId9">
-            <a:alphaModFix/>
-          </a:blip>
-          <a:stretch>
-            <a:fillRect/>
-          </a:stretch>
-        </p:blipFill>
-        <p:spPr>
-          <a:xfrm>
             <a:off x="4860575" y="4411178"/>
             <a:ext cx="2432303" cy="2469724"/>
           </a:xfrm>
@@ -7083,7 +7063,7 @@
       </p:pic>
       <p:sp>
         <p:nvSpPr>
-          <p:cNvPr id="85" name="Google Shape;85;p13"/>
+          <p:cNvPr id="84" name="Google Shape;84;p13"/>
           <p:cNvSpPr txBox="1"/>
           <p:nvPr/>
         </p:nvSpPr>
@@ -7125,7 +7105,7 @@
       </p:sp>
       <p:sp>
         <p:nvSpPr>
-          <p:cNvPr id="86" name="Google Shape;86;p13"/>
+          <p:cNvPr id="85" name="Google Shape;85;p13"/>
           <p:cNvSpPr txBox="1"/>
           <p:nvPr/>
         </p:nvSpPr>
@@ -7167,7 +7147,7 @@
       </p:sp>
       <p:sp>
         <p:nvSpPr>
-          <p:cNvPr id="87" name="Google Shape;87;p13"/>
+          <p:cNvPr id="86" name="Google Shape;86;p13"/>
           <p:cNvSpPr txBox="1"/>
           <p:nvPr/>
         </p:nvSpPr>
@@ -7209,7 +7189,7 @@
       </p:sp>
       <p:sp>
         <p:nvSpPr>
-          <p:cNvPr id="88" name="Google Shape;88;p13"/>
+          <p:cNvPr id="87" name="Google Shape;87;p13"/>
           <p:cNvSpPr txBox="1"/>
           <p:nvPr/>
         </p:nvSpPr>
@@ -7249,6 +7229,34 @@
           </a:p>
         </p:txBody>
       </p:sp>
+      <p:pic>
+        <p:nvPicPr>
+          <p:cNvPr id="88" name="Google Shape;88;p13"/>
+          <p:cNvPicPr preferRelativeResize="0"/>
+          <p:nvPr/>
+        </p:nvPicPr>
+        <p:blipFill>
+          <a:blip r:embed="rId9">
+            <a:alphaModFix/>
+          </a:blip>
+          <a:stretch>
+            <a:fillRect/>
+          </a:stretch>
+        </p:blipFill>
+        <p:spPr>
+          <a:xfrm>
+            <a:off x="2917928" y="1669978"/>
+            <a:ext cx="729537" cy="756557"/>
+          </a:xfrm>
+          <a:prstGeom prst="rect">
+            <a:avLst/>
+          </a:prstGeom>
+          <a:noFill/>
+          <a:ln>
+            <a:noFill/>
+          </a:ln>
+        </p:spPr>
+      </p:pic>
     </p:spTree>
   </p:cSld>
   <p:clrMapOvr>

</xml_diff>

<commit_message>
updated figure 1 and figure 5
</commit_message>
<xml_diff>
--- a/images/GillesPy2 Flow Graphic v3.pptx
+++ b/images/GillesPy2 Flow Graphic v3.pptx
@@ -7257,90 +7257,6 @@
           </a:p>
         </p:txBody>
       </p:sp>
-      <p:sp>
-        <p:nvSpPr>
-          <p:cNvPr id="89" name="Google Shape;89;p13"/>
-          <p:cNvSpPr txBox="1"/>
-          <p:nvPr/>
-        </p:nvSpPr>
-        <p:spPr>
-          <a:xfrm>
-            <a:off x="0" y="0"/>
-            <a:ext cx="3000000" cy="400200"/>
-          </a:xfrm>
-          <a:prstGeom prst="rect">
-            <a:avLst/>
-          </a:prstGeom>
-          <a:noFill/>
-          <a:ln>
-            <a:noFill/>
-          </a:ln>
-        </p:spPr>
-        <p:txBody>
-          <a:bodyPr anchorCtr="0" anchor="t" bIns="91425" lIns="91425" spcFirstLastPara="1" rIns="91425" wrap="square" tIns="91425">
-            <a:spAutoFit/>
-          </a:bodyPr>
-          <a:lstStyle/>
-          <a:p>
-            <a:pPr indent="0" lvl="0" marL="0" rtl="0" algn="l">
-              <a:spcBef>
-                <a:spcPts val="0"/>
-              </a:spcBef>
-              <a:spcAft>
-                <a:spcPts val="0"/>
-              </a:spcAft>
-              <a:buNone/>
-            </a:pPr>
-            <a:r>
-              <a:rPr lang="en"/>
-              <a:t>￼</a:t>
-            </a:r>
-            <a:endParaRPr/>
-          </a:p>
-        </p:txBody>
-      </p:sp>
-      <p:sp>
-        <p:nvSpPr>
-          <p:cNvPr id="90" name="Google Shape;90;p13"/>
-          <p:cNvSpPr txBox="1"/>
-          <p:nvPr/>
-        </p:nvSpPr>
-        <p:spPr>
-          <a:xfrm>
-            <a:off x="152400" y="152400"/>
-            <a:ext cx="3000000" cy="400200"/>
-          </a:xfrm>
-          <a:prstGeom prst="rect">
-            <a:avLst/>
-          </a:prstGeom>
-          <a:noFill/>
-          <a:ln>
-            <a:noFill/>
-          </a:ln>
-        </p:spPr>
-        <p:txBody>
-          <a:bodyPr anchorCtr="0" anchor="t" bIns="91425" lIns="91425" spcFirstLastPara="1" rIns="91425" wrap="square" tIns="91425">
-            <a:spAutoFit/>
-          </a:bodyPr>
-          <a:lstStyle/>
-          <a:p>
-            <a:pPr indent="0" lvl="0" marL="0" rtl="0" algn="l">
-              <a:spcBef>
-                <a:spcPts val="0"/>
-              </a:spcBef>
-              <a:spcAft>
-                <a:spcPts val="0"/>
-              </a:spcAft>
-              <a:buNone/>
-            </a:pPr>
-            <a:r>
-              <a:rPr lang="en"/>
-              <a:t>￼</a:t>
-            </a:r>
-            <a:endParaRPr/>
-          </a:p>
-        </p:txBody>
-      </p:sp>
     </p:spTree>
   </p:cSld>
   <p:clrMapOvr>
@@ -7350,6 +7266,285 @@
 </file>
 
 <file path=ppt/theme/theme1.xml><?xml version="1.0" encoding="utf-8"?>
+<a:theme xmlns:a="http://schemas.openxmlformats.org/drawingml/2006/main" xmlns:r="http://schemas.openxmlformats.org/officeDocument/2006/relationships" name="Simple Light">
+  <a:themeElements>
+    <a:clrScheme name="Simple Light">
+      <a:dk1>
+        <a:srgbClr val="000000"/>
+      </a:dk1>
+      <a:lt1>
+        <a:srgbClr val="FFFFFF"/>
+      </a:lt1>
+      <a:dk2>
+        <a:srgbClr val="595959"/>
+      </a:dk2>
+      <a:lt2>
+        <a:srgbClr val="EEEEEE"/>
+      </a:lt2>
+      <a:accent1>
+        <a:srgbClr val="FFAB40"/>
+      </a:accent1>
+      <a:accent2>
+        <a:srgbClr val="212121"/>
+      </a:accent2>
+      <a:accent3>
+        <a:srgbClr val="78909C"/>
+      </a:accent3>
+      <a:accent4>
+        <a:srgbClr val="FFAB40"/>
+      </a:accent4>
+      <a:accent5>
+        <a:srgbClr val="0097A7"/>
+      </a:accent5>
+      <a:accent6>
+        <a:srgbClr val="EEFF41"/>
+      </a:accent6>
+      <a:hlink>
+        <a:srgbClr val="0097A7"/>
+      </a:hlink>
+      <a:folHlink>
+        <a:srgbClr val="0097A7"/>
+      </a:folHlink>
+    </a:clrScheme>
+    <a:fontScheme name="Office">
+      <a:majorFont>
+        <a:latin typeface="Arial"/>
+        <a:ea typeface=""/>
+        <a:cs typeface=""/>
+        <a:font script="Jpan" typeface="ＭＳ Ｐゴシック"/>
+        <a:font script="Hang" typeface="맑은 고딕"/>
+        <a:font script="Hans" typeface="宋体"/>
+        <a:font script="Hant" typeface="新細明體"/>
+        <a:font script="Arab" typeface="Times New Roman"/>
+        <a:font script="Hebr" typeface="Times New Roman"/>
+        <a:font script="Thai" typeface="Angsana New"/>
+        <a:font script="Ethi" typeface="Nyala"/>
+        <a:font script="Beng" typeface="Vrinda"/>
+        <a:font script="Gujr" typeface="Shruti"/>
+        <a:font script="Khmr" typeface="MoolBoran"/>
+        <a:font script="Knda" typeface="Tunga"/>
+        <a:font script="Guru" typeface="Raavi"/>
+        <a:font script="Cans" typeface="Euphemia"/>
+        <a:font script="Cher" typeface="Plantagenet Cherokee"/>
+        <a:font script="Yiii" typeface="Microsoft Yi Baiti"/>
+        <a:font script="Tibt" typeface="Microsoft Himalaya"/>
+        <a:font script="Thaa" typeface="MV Boli"/>
+        <a:font script="Deva" typeface="Mangal"/>
+        <a:font script="Telu" typeface="Gautami"/>
+        <a:font script="Taml" typeface="Latha"/>
+        <a:font script="Syrc" typeface="Estrangelo Edessa"/>
+        <a:font script="Orya" typeface="Kalinga"/>
+        <a:font script="Mlym" typeface="Kartika"/>
+        <a:font script="Laoo" typeface="DokChampa"/>
+        <a:font script="Sinh" typeface="Iskoola Pota"/>
+        <a:font script="Mong" typeface="Mongolian Baiti"/>
+        <a:font script="Viet" typeface="Times New Roman"/>
+        <a:font script="Uigh" typeface="Microsoft Uighur"/>
+        <a:font script="Geor" typeface="Sylfaen"/>
+      </a:majorFont>
+      <a:minorFont>
+        <a:latin typeface="Arial"/>
+        <a:ea typeface=""/>
+        <a:cs typeface=""/>
+        <a:font script="Jpan" typeface="ＭＳ Ｐゴシック"/>
+        <a:font script="Hang" typeface="맑은 고딕"/>
+        <a:font script="Hans" typeface="宋体"/>
+        <a:font script="Hant" typeface="新細明體"/>
+        <a:font script="Arab" typeface="Arial"/>
+        <a:font script="Hebr" typeface="Arial"/>
+        <a:font script="Thai" typeface="Cordia New"/>
+        <a:font script="Ethi" typeface="Nyala"/>
+        <a:font script="Beng" typeface="Vrinda"/>
+        <a:font script="Gujr" typeface="Shruti"/>
+        <a:font script="Khmr" typeface="DaunPenh"/>
+        <a:font script="Knda" typeface="Tunga"/>
+        <a:font script="Guru" typeface="Raavi"/>
+        <a:font script="Cans" typeface="Euphemia"/>
+        <a:font script="Cher" typeface="Plantagenet Cherokee"/>
+        <a:font script="Yiii" typeface="Microsoft Yi Baiti"/>
+        <a:font script="Tibt" typeface="Microsoft Himalaya"/>
+        <a:font script="Thaa" typeface="MV Boli"/>
+        <a:font script="Deva" typeface="Mangal"/>
+        <a:font script="Telu" typeface="Gautami"/>
+        <a:font script="Taml" typeface="Latha"/>
+        <a:font script="Syrc" typeface="Estrangelo Edessa"/>
+        <a:font script="Orya" typeface="Kalinga"/>
+        <a:font script="Mlym" typeface="Kartika"/>
+        <a:font script="Laoo" typeface="DokChampa"/>
+        <a:font script="Sinh" typeface="Iskoola Pota"/>
+        <a:font script="Mong" typeface="Mongolian Baiti"/>
+        <a:font script="Viet" typeface="Arial"/>
+        <a:font script="Uigh" typeface="Microsoft Uighur"/>
+        <a:font script="Geor" typeface="Sylfaen"/>
+      </a:minorFont>
+    </a:fontScheme>
+    <a:fmtScheme name="Office">
+      <a:fillStyleLst>
+        <a:solidFill>
+          <a:schemeClr val="phClr"/>
+        </a:solidFill>
+        <a:gradFill rotWithShape="1">
+          <a:gsLst>
+            <a:gs pos="0">
+              <a:schemeClr val="phClr">
+                <a:tint val="50000"/>
+                <a:satMod val="300000"/>
+              </a:schemeClr>
+            </a:gs>
+            <a:gs pos="35000">
+              <a:schemeClr val="phClr">
+                <a:tint val="37000"/>
+                <a:satMod val="300000"/>
+              </a:schemeClr>
+            </a:gs>
+            <a:gs pos="100000">
+              <a:schemeClr val="phClr">
+                <a:tint val="15000"/>
+                <a:satMod val="350000"/>
+              </a:schemeClr>
+            </a:gs>
+          </a:gsLst>
+          <a:lin ang="16200000" scaled="1"/>
+        </a:gradFill>
+        <a:gradFill rotWithShape="1">
+          <a:gsLst>
+            <a:gs pos="0">
+              <a:schemeClr val="phClr">
+                <a:tint val="100000"/>
+                <a:shade val="100000"/>
+                <a:satMod val="130000"/>
+              </a:schemeClr>
+            </a:gs>
+            <a:gs pos="100000">
+              <a:schemeClr val="phClr">
+                <a:tint val="50000"/>
+                <a:shade val="100000"/>
+                <a:satMod val="350000"/>
+              </a:schemeClr>
+            </a:gs>
+          </a:gsLst>
+          <a:lin ang="16200000" scaled="0"/>
+        </a:gradFill>
+      </a:fillStyleLst>
+      <a:lnStyleLst>
+        <a:ln w="9525" cap="flat" cmpd="sng" algn="ctr">
+          <a:solidFill>
+            <a:schemeClr val="phClr">
+              <a:shade val="95000"/>
+              <a:satMod val="105000"/>
+            </a:schemeClr>
+          </a:solidFill>
+          <a:prstDash val="solid"/>
+        </a:ln>
+        <a:ln w="25400" cap="flat" cmpd="sng" algn="ctr">
+          <a:solidFill>
+            <a:schemeClr val="phClr"/>
+          </a:solidFill>
+          <a:prstDash val="solid"/>
+        </a:ln>
+        <a:ln w="38100" cap="flat" cmpd="sng" algn="ctr">
+          <a:solidFill>
+            <a:schemeClr val="phClr"/>
+          </a:solidFill>
+          <a:prstDash val="solid"/>
+        </a:ln>
+      </a:lnStyleLst>
+      <a:effectStyleLst>
+        <a:effectStyle>
+          <a:effectLst>
+            <a:outerShdw blurRad="40000" dist="20000" dir="5400000" rotWithShape="0">
+              <a:srgbClr val="000000">
+                <a:alpha val="38000"/>
+              </a:srgbClr>
+            </a:outerShdw>
+          </a:effectLst>
+        </a:effectStyle>
+        <a:effectStyle>
+          <a:effectLst>
+            <a:outerShdw blurRad="40000" dist="23000" dir="5400000" rotWithShape="0">
+              <a:srgbClr val="000000">
+                <a:alpha val="35000"/>
+              </a:srgbClr>
+            </a:outerShdw>
+          </a:effectLst>
+        </a:effectStyle>
+        <a:effectStyle>
+          <a:effectLst>
+            <a:outerShdw blurRad="40000" dist="23000" dir="5400000" rotWithShape="0">
+              <a:srgbClr val="000000">
+                <a:alpha val="35000"/>
+              </a:srgbClr>
+            </a:outerShdw>
+          </a:effectLst>
+          <a:scene3d>
+            <a:camera prst="orthographicFront">
+              <a:rot lat="0" lon="0" rev="0"/>
+            </a:camera>
+            <a:lightRig rig="threePt" dir="t">
+              <a:rot lat="0" lon="0" rev="1200000"/>
+            </a:lightRig>
+          </a:scene3d>
+          <a:sp3d>
+            <a:bevelT w="63500" h="25400"/>
+          </a:sp3d>
+        </a:effectStyle>
+      </a:effectStyleLst>
+      <a:bgFillStyleLst>
+        <a:solidFill>
+          <a:schemeClr val="phClr"/>
+        </a:solidFill>
+        <a:gradFill rotWithShape="1">
+          <a:gsLst>
+            <a:gs pos="0">
+              <a:schemeClr val="phClr">
+                <a:tint val="40000"/>
+                <a:satMod val="350000"/>
+              </a:schemeClr>
+            </a:gs>
+            <a:gs pos="40000">
+              <a:schemeClr val="phClr">
+                <a:tint val="45000"/>
+                <a:shade val="99000"/>
+                <a:satMod val="350000"/>
+              </a:schemeClr>
+            </a:gs>
+            <a:gs pos="100000">
+              <a:schemeClr val="phClr">
+                <a:shade val="20000"/>
+                <a:satMod val="255000"/>
+              </a:schemeClr>
+            </a:gs>
+          </a:gsLst>
+          <a:path path="circle">
+            <a:fillToRect l="50000" t="-80000" r="50000" b="180000"/>
+          </a:path>
+        </a:gradFill>
+        <a:gradFill rotWithShape="1">
+          <a:gsLst>
+            <a:gs pos="0">
+              <a:schemeClr val="phClr">
+                <a:tint val="80000"/>
+                <a:satMod val="300000"/>
+              </a:schemeClr>
+            </a:gs>
+            <a:gs pos="100000">
+              <a:schemeClr val="phClr">
+                <a:shade val="30000"/>
+                <a:satMod val="200000"/>
+              </a:schemeClr>
+            </a:gs>
+          </a:gsLst>
+          <a:path path="circle">
+            <a:fillToRect l="50000" t="50000" r="50000" b="50000"/>
+          </a:path>
+        </a:gradFill>
+      </a:bgFillStyleLst>
+    </a:fmtScheme>
+  </a:themeElements>
+</a:theme>
+</file>
+
+<file path=ppt/theme/theme2.xml><?xml version="1.0" encoding="utf-8"?>
 <a:theme xmlns:a="http://schemas.openxmlformats.org/drawingml/2006/main" xmlns:r="http://schemas.openxmlformats.org/officeDocument/2006/relationships">
   <a:themeElements>
     <a:clrScheme name="Default">
@@ -7626,283 +7821,4 @@
     </a:fmtScheme>
   </a:themeElements>
 </a:theme>
-</file>
-
-<file path=ppt/theme/theme2.xml><?xml version="1.0" encoding="utf-8"?>
-<a:theme xmlns:a="http://schemas.openxmlformats.org/drawingml/2006/main" xmlns:r="http://schemas.openxmlformats.org/officeDocument/2006/relationships" name="Simple Light">
-  <a:themeElements>
-    <a:clrScheme name="Simple Light">
-      <a:dk1>
-        <a:srgbClr val="000000"/>
-      </a:dk1>
-      <a:lt1>
-        <a:srgbClr val="FFFFFF"/>
-      </a:lt1>
-      <a:dk2>
-        <a:srgbClr val="595959"/>
-      </a:dk2>
-      <a:lt2>
-        <a:srgbClr val="EEEEEE"/>
-      </a:lt2>
-      <a:accent1>
-        <a:srgbClr val="FFAB40"/>
-      </a:accent1>
-      <a:accent2>
-        <a:srgbClr val="212121"/>
-      </a:accent2>
-      <a:accent3>
-        <a:srgbClr val="78909C"/>
-      </a:accent3>
-      <a:accent4>
-        <a:srgbClr val="FFAB40"/>
-      </a:accent4>
-      <a:accent5>
-        <a:srgbClr val="0097A7"/>
-      </a:accent5>
-      <a:accent6>
-        <a:srgbClr val="EEFF41"/>
-      </a:accent6>
-      <a:hlink>
-        <a:srgbClr val="0097A7"/>
-      </a:hlink>
-      <a:folHlink>
-        <a:srgbClr val="0097A7"/>
-      </a:folHlink>
-    </a:clrScheme>
-    <a:fontScheme name="Office">
-      <a:majorFont>
-        <a:latin typeface="Arial"/>
-        <a:ea typeface=""/>
-        <a:cs typeface=""/>
-        <a:font script="Jpan" typeface="ＭＳ Ｐゴシック"/>
-        <a:font script="Hang" typeface="맑은 고딕"/>
-        <a:font script="Hans" typeface="宋体"/>
-        <a:font script="Hant" typeface="新細明體"/>
-        <a:font script="Arab" typeface="Times New Roman"/>
-        <a:font script="Hebr" typeface="Times New Roman"/>
-        <a:font script="Thai" typeface="Angsana New"/>
-        <a:font script="Ethi" typeface="Nyala"/>
-        <a:font script="Beng" typeface="Vrinda"/>
-        <a:font script="Gujr" typeface="Shruti"/>
-        <a:font script="Khmr" typeface="MoolBoran"/>
-        <a:font script="Knda" typeface="Tunga"/>
-        <a:font script="Guru" typeface="Raavi"/>
-        <a:font script="Cans" typeface="Euphemia"/>
-        <a:font script="Cher" typeface="Plantagenet Cherokee"/>
-        <a:font script="Yiii" typeface="Microsoft Yi Baiti"/>
-        <a:font script="Tibt" typeface="Microsoft Himalaya"/>
-        <a:font script="Thaa" typeface="MV Boli"/>
-        <a:font script="Deva" typeface="Mangal"/>
-        <a:font script="Telu" typeface="Gautami"/>
-        <a:font script="Taml" typeface="Latha"/>
-        <a:font script="Syrc" typeface="Estrangelo Edessa"/>
-        <a:font script="Orya" typeface="Kalinga"/>
-        <a:font script="Mlym" typeface="Kartika"/>
-        <a:font script="Laoo" typeface="DokChampa"/>
-        <a:font script="Sinh" typeface="Iskoola Pota"/>
-        <a:font script="Mong" typeface="Mongolian Baiti"/>
-        <a:font script="Viet" typeface="Times New Roman"/>
-        <a:font script="Uigh" typeface="Microsoft Uighur"/>
-        <a:font script="Geor" typeface="Sylfaen"/>
-      </a:majorFont>
-      <a:minorFont>
-        <a:latin typeface="Arial"/>
-        <a:ea typeface=""/>
-        <a:cs typeface=""/>
-        <a:font script="Jpan" typeface="ＭＳ Ｐゴシック"/>
-        <a:font script="Hang" typeface="맑은 고딕"/>
-        <a:font script="Hans" typeface="宋体"/>
-        <a:font script="Hant" typeface="新細明體"/>
-        <a:font script="Arab" typeface="Arial"/>
-        <a:font script="Hebr" typeface="Arial"/>
-        <a:font script="Thai" typeface="Cordia New"/>
-        <a:font script="Ethi" typeface="Nyala"/>
-        <a:font script="Beng" typeface="Vrinda"/>
-        <a:font script="Gujr" typeface="Shruti"/>
-        <a:font script="Khmr" typeface="DaunPenh"/>
-        <a:font script="Knda" typeface="Tunga"/>
-        <a:font script="Guru" typeface="Raavi"/>
-        <a:font script="Cans" typeface="Euphemia"/>
-        <a:font script="Cher" typeface="Plantagenet Cherokee"/>
-        <a:font script="Yiii" typeface="Microsoft Yi Baiti"/>
-        <a:font script="Tibt" typeface="Microsoft Himalaya"/>
-        <a:font script="Thaa" typeface="MV Boli"/>
-        <a:font script="Deva" typeface="Mangal"/>
-        <a:font script="Telu" typeface="Gautami"/>
-        <a:font script="Taml" typeface="Latha"/>
-        <a:font script="Syrc" typeface="Estrangelo Edessa"/>
-        <a:font script="Orya" typeface="Kalinga"/>
-        <a:font script="Mlym" typeface="Kartika"/>
-        <a:font script="Laoo" typeface="DokChampa"/>
-        <a:font script="Sinh" typeface="Iskoola Pota"/>
-        <a:font script="Mong" typeface="Mongolian Baiti"/>
-        <a:font script="Viet" typeface="Arial"/>
-        <a:font script="Uigh" typeface="Microsoft Uighur"/>
-        <a:font script="Geor" typeface="Sylfaen"/>
-      </a:minorFont>
-    </a:fontScheme>
-    <a:fmtScheme name="Office">
-      <a:fillStyleLst>
-        <a:solidFill>
-          <a:schemeClr val="phClr"/>
-        </a:solidFill>
-        <a:gradFill rotWithShape="1">
-          <a:gsLst>
-            <a:gs pos="0">
-              <a:schemeClr val="phClr">
-                <a:tint val="50000"/>
-                <a:satMod val="300000"/>
-              </a:schemeClr>
-            </a:gs>
-            <a:gs pos="35000">
-              <a:schemeClr val="phClr">
-                <a:tint val="37000"/>
-                <a:satMod val="300000"/>
-              </a:schemeClr>
-            </a:gs>
-            <a:gs pos="100000">
-              <a:schemeClr val="phClr">
-                <a:tint val="15000"/>
-                <a:satMod val="350000"/>
-              </a:schemeClr>
-            </a:gs>
-          </a:gsLst>
-          <a:lin ang="16200000" scaled="1"/>
-        </a:gradFill>
-        <a:gradFill rotWithShape="1">
-          <a:gsLst>
-            <a:gs pos="0">
-              <a:schemeClr val="phClr">
-                <a:tint val="100000"/>
-                <a:shade val="100000"/>
-                <a:satMod val="130000"/>
-              </a:schemeClr>
-            </a:gs>
-            <a:gs pos="100000">
-              <a:schemeClr val="phClr">
-                <a:tint val="50000"/>
-                <a:shade val="100000"/>
-                <a:satMod val="350000"/>
-              </a:schemeClr>
-            </a:gs>
-          </a:gsLst>
-          <a:lin ang="16200000" scaled="0"/>
-        </a:gradFill>
-      </a:fillStyleLst>
-      <a:lnStyleLst>
-        <a:ln w="9525" cap="flat" cmpd="sng" algn="ctr">
-          <a:solidFill>
-            <a:schemeClr val="phClr">
-              <a:shade val="95000"/>
-              <a:satMod val="105000"/>
-            </a:schemeClr>
-          </a:solidFill>
-          <a:prstDash val="solid"/>
-        </a:ln>
-        <a:ln w="25400" cap="flat" cmpd="sng" algn="ctr">
-          <a:solidFill>
-            <a:schemeClr val="phClr"/>
-          </a:solidFill>
-          <a:prstDash val="solid"/>
-        </a:ln>
-        <a:ln w="38100" cap="flat" cmpd="sng" algn="ctr">
-          <a:solidFill>
-            <a:schemeClr val="phClr"/>
-          </a:solidFill>
-          <a:prstDash val="solid"/>
-        </a:ln>
-      </a:lnStyleLst>
-      <a:effectStyleLst>
-        <a:effectStyle>
-          <a:effectLst>
-            <a:outerShdw blurRad="40000" dist="20000" dir="5400000" rotWithShape="0">
-              <a:srgbClr val="000000">
-                <a:alpha val="38000"/>
-              </a:srgbClr>
-            </a:outerShdw>
-          </a:effectLst>
-        </a:effectStyle>
-        <a:effectStyle>
-          <a:effectLst>
-            <a:outerShdw blurRad="40000" dist="23000" dir="5400000" rotWithShape="0">
-              <a:srgbClr val="000000">
-                <a:alpha val="35000"/>
-              </a:srgbClr>
-            </a:outerShdw>
-          </a:effectLst>
-        </a:effectStyle>
-        <a:effectStyle>
-          <a:effectLst>
-            <a:outerShdw blurRad="40000" dist="23000" dir="5400000" rotWithShape="0">
-              <a:srgbClr val="000000">
-                <a:alpha val="35000"/>
-              </a:srgbClr>
-            </a:outerShdw>
-          </a:effectLst>
-          <a:scene3d>
-            <a:camera prst="orthographicFront">
-              <a:rot lat="0" lon="0" rev="0"/>
-            </a:camera>
-            <a:lightRig rig="threePt" dir="t">
-              <a:rot lat="0" lon="0" rev="1200000"/>
-            </a:lightRig>
-          </a:scene3d>
-          <a:sp3d>
-            <a:bevelT w="63500" h="25400"/>
-          </a:sp3d>
-        </a:effectStyle>
-      </a:effectStyleLst>
-      <a:bgFillStyleLst>
-        <a:solidFill>
-          <a:schemeClr val="phClr"/>
-        </a:solidFill>
-        <a:gradFill rotWithShape="1">
-          <a:gsLst>
-            <a:gs pos="0">
-              <a:schemeClr val="phClr">
-                <a:tint val="40000"/>
-                <a:satMod val="350000"/>
-              </a:schemeClr>
-            </a:gs>
-            <a:gs pos="40000">
-              <a:schemeClr val="phClr">
-                <a:tint val="45000"/>
-                <a:shade val="99000"/>
-                <a:satMod val="350000"/>
-              </a:schemeClr>
-            </a:gs>
-            <a:gs pos="100000">
-              <a:schemeClr val="phClr">
-                <a:shade val="20000"/>
-                <a:satMod val="255000"/>
-              </a:schemeClr>
-            </a:gs>
-          </a:gsLst>
-          <a:path path="circle">
-            <a:fillToRect l="50000" t="-80000" r="50000" b="180000"/>
-          </a:path>
-        </a:gradFill>
-        <a:gradFill rotWithShape="1">
-          <a:gsLst>
-            <a:gs pos="0">
-              <a:schemeClr val="phClr">
-                <a:tint val="80000"/>
-                <a:satMod val="300000"/>
-              </a:schemeClr>
-            </a:gs>
-            <a:gs pos="100000">
-              <a:schemeClr val="phClr">
-                <a:shade val="30000"/>
-                <a:satMod val="200000"/>
-              </a:schemeClr>
-            </a:gs>
-          </a:gsLst>
-          <a:path path="circle">
-            <a:fillToRect l="50000" t="50000" r="50000" b="50000"/>
-          </a:path>
-        </a:gradFill>
-      </a:bgFillStyleLst>
-    </a:fmtScheme>
-  </a:themeElements>
-</a:theme>
 </file>
</xml_diff>